<commit_message>
minor updates to presentation notes
</commit_message>
<xml_diff>
--- a/user-engagement/fpp-presentation.pptx
+++ b/user-engagement/fpp-presentation.pptx
@@ -7,6 +7,8 @@
   <p:sldIdLst>
     <p:sldId id="256" r:id="rId2"/>
     <p:sldId id="257" r:id="rId3"/>
+    <p:sldId id="258" r:id="rId4"/>
+    <p:sldId id="259" r:id="rId5"/>
   </p:sldIdLst>
   <p:sldSz cx="12192000" cy="6858000"/>
   <p:notesSz cx="6858000" cy="9144000"/>
@@ -262,7 +264,7 @@
           <a:p>
             <a:fld id="{CAAB38E9-6A6F-4A20-AE79-6273898C48E9}" type="datetimeFigureOut">
               <a:rPr lang="en-GB" smtClean="0"/>
-              <a:t>24/06/2021</a:t>
+              <a:t>25/06/2021</a:t>
             </a:fld>
             <a:endParaRPr lang="en-GB"/>
           </a:p>
@@ -462,7 +464,7 @@
           <a:p>
             <a:fld id="{CAAB38E9-6A6F-4A20-AE79-6273898C48E9}" type="datetimeFigureOut">
               <a:rPr lang="en-GB" smtClean="0"/>
-              <a:t>24/06/2021</a:t>
+              <a:t>25/06/2021</a:t>
             </a:fld>
             <a:endParaRPr lang="en-GB"/>
           </a:p>
@@ -672,7 +674,7 @@
           <a:p>
             <a:fld id="{CAAB38E9-6A6F-4A20-AE79-6273898C48E9}" type="datetimeFigureOut">
               <a:rPr lang="en-GB" smtClean="0"/>
-              <a:t>24/06/2021</a:t>
+              <a:t>25/06/2021</a:t>
             </a:fld>
             <a:endParaRPr lang="en-GB"/>
           </a:p>
@@ -872,7 +874,7 @@
           <a:p>
             <a:fld id="{CAAB38E9-6A6F-4A20-AE79-6273898C48E9}" type="datetimeFigureOut">
               <a:rPr lang="en-GB" smtClean="0"/>
-              <a:t>24/06/2021</a:t>
+              <a:t>25/06/2021</a:t>
             </a:fld>
             <a:endParaRPr lang="en-GB"/>
           </a:p>
@@ -1148,7 +1150,7 @@
           <a:p>
             <a:fld id="{CAAB38E9-6A6F-4A20-AE79-6273898C48E9}" type="datetimeFigureOut">
               <a:rPr lang="en-GB" smtClean="0"/>
-              <a:t>24/06/2021</a:t>
+              <a:t>25/06/2021</a:t>
             </a:fld>
             <a:endParaRPr lang="en-GB"/>
           </a:p>
@@ -1416,7 +1418,7 @@
           <a:p>
             <a:fld id="{CAAB38E9-6A6F-4A20-AE79-6273898C48E9}" type="datetimeFigureOut">
               <a:rPr lang="en-GB" smtClean="0"/>
-              <a:t>24/06/2021</a:t>
+              <a:t>25/06/2021</a:t>
             </a:fld>
             <a:endParaRPr lang="en-GB"/>
           </a:p>
@@ -1831,7 +1833,7 @@
           <a:p>
             <a:fld id="{CAAB38E9-6A6F-4A20-AE79-6273898C48E9}" type="datetimeFigureOut">
               <a:rPr lang="en-GB" smtClean="0"/>
-              <a:t>24/06/2021</a:t>
+              <a:t>25/06/2021</a:t>
             </a:fld>
             <a:endParaRPr lang="en-GB"/>
           </a:p>
@@ -1973,7 +1975,7 @@
           <a:p>
             <a:fld id="{CAAB38E9-6A6F-4A20-AE79-6273898C48E9}" type="datetimeFigureOut">
               <a:rPr lang="en-GB" smtClean="0"/>
-              <a:t>24/06/2021</a:t>
+              <a:t>25/06/2021</a:t>
             </a:fld>
             <a:endParaRPr lang="en-GB"/>
           </a:p>
@@ -2086,7 +2088,7 @@
           <a:p>
             <a:fld id="{CAAB38E9-6A6F-4A20-AE79-6273898C48E9}" type="datetimeFigureOut">
               <a:rPr lang="en-GB" smtClean="0"/>
-              <a:t>24/06/2021</a:t>
+              <a:t>25/06/2021</a:t>
             </a:fld>
             <a:endParaRPr lang="en-GB"/>
           </a:p>
@@ -2399,7 +2401,7 @@
           <a:p>
             <a:fld id="{CAAB38E9-6A6F-4A20-AE79-6273898C48E9}" type="datetimeFigureOut">
               <a:rPr lang="en-GB" smtClean="0"/>
-              <a:t>24/06/2021</a:t>
+              <a:t>25/06/2021</a:t>
             </a:fld>
             <a:endParaRPr lang="en-GB"/>
           </a:p>
@@ -2688,7 +2690,7 @@
           <a:p>
             <a:fld id="{CAAB38E9-6A6F-4A20-AE79-6273898C48E9}" type="datetimeFigureOut">
               <a:rPr lang="en-GB" smtClean="0"/>
-              <a:t>24/06/2021</a:t>
+              <a:t>25/06/2021</a:t>
             </a:fld>
             <a:endParaRPr lang="en-GB"/>
           </a:p>
@@ -2931,7 +2933,7 @@
           <a:p>
             <a:fld id="{CAAB38E9-6A6F-4A20-AE79-6273898C48E9}" type="datetimeFigureOut">
               <a:rPr lang="en-GB" smtClean="0"/>
-              <a:t>24/06/2021</a:t>
+              <a:t>25/06/2021</a:t>
             </a:fld>
             <a:endParaRPr lang="en-GB"/>
           </a:p>
@@ -3363,7 +3365,7 @@
         <p:spPr>
           <a:xfrm>
             <a:off x="625503" y="594360"/>
-            <a:ext cx="10925092" cy="6463308"/>
+            <a:ext cx="10925092" cy="4247317"/>
           </a:xfrm>
           <a:prstGeom prst="rect">
             <a:avLst/>
@@ -3487,86 +3489,6 @@
             <a:r>
               <a:rPr lang="en-GB" dirty="0"/>
               <a:t>Show some of the output: mentions over time (1yr) from dash, show histogram of each topic, split mentions by party, most regular mention-er (name &amp; pic?), </a:t>
-            </a:r>
-          </a:p>
-          <a:p>
-            <a:pPr marL="285750" indent="-285750">
-              <a:buFontTx/>
-              <a:buChar char="-"/>
-            </a:pPr>
-            <a:r>
-              <a:rPr lang="en-GB" dirty="0"/>
-              <a:t>Next steps for project</a:t>
-            </a:r>
-          </a:p>
-          <a:p>
-            <a:pPr marL="742950" lvl="1" indent="-285750">
-              <a:buFontTx/>
-              <a:buChar char="-"/>
-            </a:pPr>
-            <a:r>
-              <a:rPr lang="en-GB" dirty="0"/>
-              <a:t>Live data</a:t>
-            </a:r>
-          </a:p>
-          <a:p>
-            <a:pPr marL="285750" indent="-285750">
-              <a:buFontTx/>
-              <a:buChar char="-"/>
-            </a:pPr>
-            <a:r>
-              <a:rPr lang="en-GB" dirty="0"/>
-              <a:t>Next steps overall:</a:t>
-            </a:r>
-          </a:p>
-          <a:p>
-            <a:pPr marL="742950" lvl="1" indent="-285750">
-              <a:buFontTx/>
-              <a:buChar char="-"/>
-            </a:pPr>
-            <a:r>
-              <a:rPr lang="en-GB" dirty="0"/>
-              <a:t>What else we could do with DS skills – give examples</a:t>
-            </a:r>
-          </a:p>
-          <a:p>
-            <a:pPr marL="742950" lvl="1" indent="-285750">
-              <a:buFontTx/>
-              <a:buChar char="-"/>
-            </a:pPr>
-            <a:r>
-              <a:rPr lang="en-GB" dirty="0"/>
-              <a:t>X-data gov possibilities for my Hansard work </a:t>
-            </a:r>
-          </a:p>
-          <a:p>
-            <a:pPr marL="1200150" lvl="2" indent="-285750">
-              <a:buFontTx/>
-              <a:buChar char="-"/>
-            </a:pPr>
-            <a:r>
-              <a:rPr lang="en-GB" dirty="0"/>
-              <a:t>Other departments may want to copy?</a:t>
-            </a:r>
-          </a:p>
-          <a:p>
-            <a:pPr marL="1200150" lvl="2" indent="-285750">
-              <a:buFontTx/>
-              <a:buChar char="-"/>
-            </a:pPr>
-            <a:r>
-              <a:rPr lang="en-GB" dirty="0"/>
-              <a:t>Go to Hansard directly – something they could build in to their site?</a:t>
-            </a:r>
-          </a:p>
-          <a:p>
-            <a:pPr marL="742950" lvl="1" indent="-285750">
-              <a:buFontTx/>
-              <a:buChar char="-"/>
-            </a:pPr>
-            <a:r>
-              <a:rPr lang="en-GB" dirty="0"/>
-              <a:t>Michael Hodge &gt; OSR interest in identifying mentions of statistics </a:t>
             </a:r>
           </a:p>
         </p:txBody>
@@ -3877,6 +3799,298 @@
     <p:extLst>
       <p:ext uri="{BB962C8B-B14F-4D97-AF65-F5344CB8AC3E}">
         <p14:creationId xmlns:p14="http://schemas.microsoft.com/office/powerpoint/2010/main" val="3536756216"/>
+      </p:ext>
+    </p:extLst>
+  </p:cSld>
+  <p:clrMapOvr>
+    <a:masterClrMapping/>
+  </p:clrMapOvr>
+</p:sld>
+</file>
+
+<file path=ppt/slides/slide3.xml><?xml version="1.0" encoding="utf-8"?>
+<p:sld xmlns:a="http://schemas.openxmlformats.org/drawingml/2006/main" xmlns:r="http://schemas.openxmlformats.org/officeDocument/2006/relationships" xmlns:p="http://schemas.openxmlformats.org/presentationml/2006/main">
+  <p:cSld>
+    <p:spTree>
+      <p:nvGrpSpPr>
+        <p:cNvPr id="1" name=""/>
+        <p:cNvGrpSpPr/>
+        <p:nvPr/>
+      </p:nvGrpSpPr>
+      <p:grpSpPr>
+        <a:xfrm>
+          <a:off x="0" y="0"/>
+          <a:ext cx="0" cy="0"/>
+          <a:chOff x="0" y="0"/>
+          <a:chExt cx="0" cy="0"/>
+        </a:xfrm>
+      </p:grpSpPr>
+      <p:sp>
+        <p:nvSpPr>
+          <p:cNvPr id="2" name="Title 1">
+            <a:extLst>
+              <a:ext uri="{FF2B5EF4-FFF2-40B4-BE49-F238E27FC236}">
+                <a16:creationId xmlns:a16="http://schemas.microsoft.com/office/drawing/2014/main" id="{B0F100FA-59D9-4F0B-B6B3-04F29CA19C49}"/>
+              </a:ext>
+            </a:extLst>
+          </p:cNvPr>
+          <p:cNvSpPr>
+            <a:spLocks noGrp="1"/>
+          </p:cNvSpPr>
+          <p:nvPr>
+            <p:ph type="title"/>
+          </p:nvPr>
+        </p:nvSpPr>
+        <p:spPr/>
+        <p:txBody>
+          <a:bodyPr/>
+          <a:lstStyle/>
+          <a:p>
+            <a:endParaRPr lang="en-GB"/>
+          </a:p>
+        </p:txBody>
+      </p:sp>
+      <p:sp>
+        <p:nvSpPr>
+          <p:cNvPr id="3" name="Content Placeholder 2">
+            <a:extLst>
+              <a:ext uri="{FF2B5EF4-FFF2-40B4-BE49-F238E27FC236}">
+                <a16:creationId xmlns:a16="http://schemas.microsoft.com/office/drawing/2014/main" id="{8EB09008-9B19-4E05-A946-426DA3DD2573}"/>
+              </a:ext>
+            </a:extLst>
+          </p:cNvPr>
+          <p:cNvSpPr>
+            <a:spLocks noGrp="1"/>
+          </p:cNvSpPr>
+          <p:nvPr>
+            <p:ph idx="1"/>
+          </p:nvPr>
+        </p:nvSpPr>
+        <p:spPr/>
+        <p:txBody>
+          <a:bodyPr/>
+          <a:lstStyle/>
+          <a:p>
+            <a:r>
+              <a:rPr lang="en-GB" dirty="0"/>
+              <a:t>Add some joke about wizards for Rhys!</a:t>
+            </a:r>
+          </a:p>
+        </p:txBody>
+      </p:sp>
+    </p:spTree>
+    <p:extLst>
+      <p:ext uri="{BB962C8B-B14F-4D97-AF65-F5344CB8AC3E}">
+        <p14:creationId xmlns:p14="http://schemas.microsoft.com/office/powerpoint/2010/main" val="2254089530"/>
+      </p:ext>
+    </p:extLst>
+  </p:cSld>
+  <p:clrMapOvr>
+    <a:masterClrMapping/>
+  </p:clrMapOvr>
+</p:sld>
+</file>
+
+<file path=ppt/slides/slide4.xml><?xml version="1.0" encoding="utf-8"?>
+<p:sld xmlns:a="http://schemas.openxmlformats.org/drawingml/2006/main" xmlns:r="http://schemas.openxmlformats.org/officeDocument/2006/relationships" xmlns:p="http://schemas.openxmlformats.org/presentationml/2006/main">
+  <p:cSld>
+    <p:spTree>
+      <p:nvGrpSpPr>
+        <p:cNvPr id="1" name=""/>
+        <p:cNvGrpSpPr/>
+        <p:nvPr/>
+      </p:nvGrpSpPr>
+      <p:grpSpPr>
+        <a:xfrm>
+          <a:off x="0" y="0"/>
+          <a:ext cx="0" cy="0"/>
+          <a:chOff x="0" y="0"/>
+          <a:chExt cx="0" cy="0"/>
+        </a:xfrm>
+      </p:grpSpPr>
+      <p:sp>
+        <p:nvSpPr>
+          <p:cNvPr id="2" name="Title 1">
+            <a:extLst>
+              <a:ext uri="{FF2B5EF4-FFF2-40B4-BE49-F238E27FC236}">
+                <a16:creationId xmlns:a16="http://schemas.microsoft.com/office/drawing/2014/main" id="{7A4E86CA-2429-4A25-90A9-6B3F570A06FA}"/>
+              </a:ext>
+            </a:extLst>
+          </p:cNvPr>
+          <p:cNvSpPr>
+            <a:spLocks noGrp="1"/>
+          </p:cNvSpPr>
+          <p:nvPr>
+            <p:ph type="title"/>
+          </p:nvPr>
+        </p:nvSpPr>
+        <p:spPr/>
+        <p:txBody>
+          <a:bodyPr/>
+          <a:lstStyle/>
+          <a:p>
+            <a:r>
+              <a:rPr lang="en-GB" dirty="0"/>
+              <a:t>Next Steps</a:t>
+            </a:r>
+          </a:p>
+        </p:txBody>
+      </p:sp>
+      <p:sp>
+        <p:nvSpPr>
+          <p:cNvPr id="3" name="Content Placeholder 2">
+            <a:extLst>
+              <a:ext uri="{FF2B5EF4-FFF2-40B4-BE49-F238E27FC236}">
+                <a16:creationId xmlns:a16="http://schemas.microsoft.com/office/drawing/2014/main" id="{06695A5B-FF49-4F69-9475-C86C4CF89959}"/>
+              </a:ext>
+            </a:extLst>
+          </p:cNvPr>
+          <p:cNvSpPr>
+            <a:spLocks noGrp="1"/>
+          </p:cNvSpPr>
+          <p:nvPr>
+            <p:ph idx="1"/>
+          </p:nvPr>
+        </p:nvSpPr>
+        <p:spPr/>
+        <p:txBody>
+          <a:bodyPr>
+            <a:normAutofit fontScale="70000" lnSpcReduction="20000"/>
+          </a:bodyPr>
+          <a:lstStyle/>
+          <a:p>
+            <a:pPr marL="285750" indent="-285750">
+              <a:buFontTx/>
+              <a:buChar char="-"/>
+            </a:pPr>
+            <a:r>
+              <a:rPr lang="en-GB" dirty="0"/>
+              <a:t>Next steps for project</a:t>
+            </a:r>
+          </a:p>
+          <a:p>
+            <a:pPr marL="742950" lvl="1" indent="-285750">
+              <a:buFontTx/>
+              <a:buChar char="-"/>
+            </a:pPr>
+            <a:r>
+              <a:rPr lang="en-GB" dirty="0"/>
+              <a:t>Live data</a:t>
+            </a:r>
+          </a:p>
+          <a:p>
+            <a:r>
+              <a:rPr lang="en-GB" dirty="0"/>
+              <a:t>Looking at govt policy papers (T&amp;F group)</a:t>
+            </a:r>
+          </a:p>
+          <a:p>
+            <a:pPr marL="285750" indent="-285750">
+              <a:buFontTx/>
+              <a:buChar char="-"/>
+            </a:pPr>
+            <a:r>
+              <a:rPr lang="en-GB" dirty="0"/>
+              <a:t>Next steps overall:</a:t>
+            </a:r>
+          </a:p>
+          <a:p>
+            <a:pPr marL="742950" lvl="1" indent="-285750">
+              <a:buFontTx/>
+              <a:buChar char="-"/>
+            </a:pPr>
+            <a:r>
+              <a:rPr lang="en-GB" dirty="0"/>
+              <a:t>What else we could do with DS skills – give examples</a:t>
+            </a:r>
+          </a:p>
+          <a:p>
+            <a:pPr marL="742950" lvl="1" indent="-285750">
+              <a:buFontTx/>
+              <a:buChar char="-"/>
+            </a:pPr>
+            <a:r>
+              <a:rPr lang="en-GB" dirty="0"/>
+              <a:t>X-data gov possibilities for my Hansard work </a:t>
+            </a:r>
+          </a:p>
+          <a:p>
+            <a:pPr marL="1200150" lvl="2" indent="-285750">
+              <a:buFontTx/>
+              <a:buChar char="-"/>
+            </a:pPr>
+            <a:r>
+              <a:rPr lang="en-GB" dirty="0"/>
+              <a:t>Other departments may want to copy?</a:t>
+            </a:r>
+          </a:p>
+          <a:p>
+            <a:pPr marL="1200150" lvl="2" indent="-285750">
+              <a:buFontTx/>
+              <a:buChar char="-"/>
+            </a:pPr>
+            <a:r>
+              <a:rPr lang="en-GB" dirty="0"/>
+              <a:t>Go to Hansard directly – something they could build in to their site?</a:t>
+            </a:r>
+          </a:p>
+          <a:p>
+            <a:pPr marL="742950" lvl="1" indent="-285750">
+              <a:buFontTx/>
+              <a:buChar char="-"/>
+            </a:pPr>
+            <a:r>
+              <a:rPr lang="en-GB" dirty="0"/>
+              <a:t>Michael Hodge &gt; OSR interest in identifying mentions of statistics </a:t>
+            </a:r>
+          </a:p>
+          <a:p>
+            <a:r>
+              <a:rPr lang="en-GB" dirty="0"/>
+              <a:t>Interest from other teams for similar work on other datasets</a:t>
+            </a:r>
+          </a:p>
+          <a:p>
+            <a:r>
+              <a:rPr lang="en-GB" dirty="0"/>
+              <a:t>Private sector - board reports/annual reports &gt; do ONS economic stats get mentioned?</a:t>
+            </a:r>
+          </a:p>
+          <a:p>
+            <a:r>
+              <a:rPr lang="en-GB" dirty="0"/>
+              <a:t>OSR -&gt; using </a:t>
+            </a:r>
+            <a:r>
+              <a:rPr lang="en-GB" dirty="0" err="1"/>
+              <a:t>hansard</a:t>
+            </a:r>
+            <a:r>
+              <a:rPr lang="en-GB" dirty="0"/>
+              <a:t> data to help with evaluating how stats are used (Michael Hodge). Identifying use of stats in parliament.</a:t>
+            </a:r>
+          </a:p>
+          <a:p>
+            <a:r>
+              <a:rPr lang="en-GB" dirty="0"/>
+              <a:t>Anything with quality of forecasting - still way out at the start and at end of FY find we're fine</a:t>
+            </a:r>
+          </a:p>
+          <a:p>
+            <a:r>
+              <a:rPr lang="en-GB" dirty="0"/>
+              <a:t>Vacancies - creating model that updates with the latest data each month(?)</a:t>
+            </a:r>
+          </a:p>
+          <a:p>
+            <a:endParaRPr lang="en-GB" dirty="0"/>
+          </a:p>
+        </p:txBody>
+      </p:sp>
+    </p:spTree>
+    <p:extLst>
+      <p:ext uri="{BB962C8B-B14F-4D97-AF65-F5344CB8AC3E}">
+        <p14:creationId xmlns:p14="http://schemas.microsoft.com/office/powerpoint/2010/main" val="1230815884"/>
       </p:ext>
     </p:extLst>
   </p:cSld>

</xml_diff>